<commit_message>
update source code link
</commit_message>
<xml_diff>
--- a/20140428_Android_Accessbility.pptx
+++ b/20140428_Android_Accessbility.pptx
@@ -208,7 +208,7 @@
             <a:fld id="{E58C5F15-C5DD-FB43-B511-C3AC48B76EA6}" type="datetimeFigureOut">
               <a:rPr lang="en-US" smtClean="0"/>
               <a:pPr/>
-              <a:t>4/27/2014</a:t>
+              <a:t>7/23/2014</a:t>
             </a:fld>
             <a:endParaRPr lang="en-US"/>
           </a:p>
@@ -377,7 +377,7 @@
     </p:spTree>
     <p:extLst>
       <p:ext uri="{BB962C8B-B14F-4D97-AF65-F5344CB8AC3E}">
-        <p14:creationId xmlns:p14="http://schemas.microsoft.com/office/powerpoint/2010/main" xmlns="" val="1932123049"/>
+        <p14:creationId xmlns:p14="http://schemas.microsoft.com/office/powerpoint/2010/main" val="1932123049"/>
       </p:ext>
     </p:extLst>
   </p:cSld>
@@ -786,7 +786,7 @@
     </p:spTree>
     <p:extLst>
       <p:ext uri="{BB962C8B-B14F-4D97-AF65-F5344CB8AC3E}">
-        <p14:creationId xmlns:p14="http://schemas.microsoft.com/office/powerpoint/2010/main" xmlns="" val="1916744474"/>
+        <p14:creationId xmlns:p14="http://schemas.microsoft.com/office/powerpoint/2010/main" val="1916744474"/>
       </p:ext>
     </p:extLst>
   </p:cSld>
@@ -1427,7 +1427,7 @@
     </p:spTree>
     <p:extLst>
       <p:ext uri="{BB962C8B-B14F-4D97-AF65-F5344CB8AC3E}">
-        <p14:creationId xmlns:p14="http://schemas.microsoft.com/office/powerpoint/2010/main" xmlns="" val="862452508"/>
+        <p14:creationId xmlns:p14="http://schemas.microsoft.com/office/powerpoint/2010/main" val="862452508"/>
       </p:ext>
     </p:extLst>
   </p:cSld>
@@ -2341,7 +2341,7 @@
     </p:spTree>
     <p:extLst>
       <p:ext uri="{BB962C8B-B14F-4D97-AF65-F5344CB8AC3E}">
-        <p14:creationId xmlns:p14="http://schemas.microsoft.com/office/powerpoint/2010/main" xmlns="" val="3431118554"/>
+        <p14:creationId xmlns:p14="http://schemas.microsoft.com/office/powerpoint/2010/main" val="3431118554"/>
       </p:ext>
     </p:extLst>
   </p:cSld>
@@ -2405,7 +2405,19 @@
                 <a:ea typeface="+mn-ea"/>
                 <a:cs typeface="+mn-cs"/>
               </a:rPr>
-              <a:t>and </a:t>
+              <a:t>and selecting (activating) user interface elements. In Android 4.1 (API Level 16) </a:t>
+            </a:r>
+            <a:r>
+              <a:rPr lang="en-US" altLang="zh-CN" sz="1200" b="0" i="0" kern="1200" dirty="0" err="1" smtClean="0">
+                <a:solidFill>
+                  <a:schemeClr val="tx1"/>
+                </a:solidFill>
+                <a:effectLst/>
+                <a:latin typeface="+mn-lt"/>
+                <a:ea typeface="+mn-ea"/>
+                <a:cs typeface="+mn-cs"/>
+              </a:rPr>
+              <a:t>theStarting</a:t>
             </a:r>
             <a:r>
               <a:rPr lang="en-US" altLang="zh-CN" sz="1200" b="0" i="0" kern="1200" dirty="0" smtClean="0">
@@ -2417,43 +2429,7 @@
                 <a:ea typeface="+mn-ea"/>
                 <a:cs typeface="+mn-cs"/>
               </a:rPr>
-              <a:t>selecting (activating) user interface elements. In Android 4.1 (API Level 16) </a:t>
-            </a:r>
-            <a:r>
-              <a:rPr lang="en-US" altLang="zh-CN" sz="1200" b="0" i="0" kern="1200" dirty="0" err="1" smtClean="0">
-                <a:solidFill>
-                  <a:schemeClr val="tx1"/>
-                </a:solidFill>
-                <a:effectLst/>
-                <a:latin typeface="+mn-lt"/>
-                <a:ea typeface="+mn-ea"/>
-                <a:cs typeface="+mn-cs"/>
-              </a:rPr>
-              <a:t>theStarting</a:t>
-            </a:r>
-            <a:r>
-              <a:rPr lang="en-US" altLang="zh-CN" sz="1200" b="0" i="0" kern="1200" dirty="0" smtClean="0">
-                <a:solidFill>
-                  <a:schemeClr val="tx1"/>
-                </a:solidFill>
-                <a:effectLst/>
-                <a:latin typeface="+mn-lt"/>
-                <a:ea typeface="+mn-ea"/>
-                <a:cs typeface="+mn-cs"/>
-              </a:rPr>
-              <a:t> with Android 4.0 (API Level 14), accessibility services can act on behalf of users, including changing the input focus  </a:t>
-            </a:r>
-            <a:r>
-              <a:rPr lang="en-US" altLang="zh-CN" sz="1200" b="0" i="0" kern="1200" dirty="0" smtClean="0">
-                <a:solidFill>
-                  <a:schemeClr val="tx1"/>
-                </a:solidFill>
-                <a:effectLst/>
-                <a:latin typeface="+mn-lt"/>
-                <a:ea typeface="+mn-ea"/>
-                <a:cs typeface="+mn-cs"/>
-              </a:rPr>
-              <a:t>range of actions has been expanded to include scrolling lists and interacting with text fields. Accessibility services can also take global actions, such as navigating to the Home screen, pressing the Back button, opening the notifications screen and recent applications list. Android 4.1 also includes a new type of focus, </a:t>
+              <a:t> with Android 4.0 (API Level 14), accessibility services can act on behalf of users, including changing the input focus  range of actions has been expanded to include scrolling lists and interacting with text fields. Accessibility services can also take global actions, such as navigating to the Home screen, pressing the Back button, opening the notifications screen and recent applications list. Android 4.1 also includes a new type of focus, </a:t>
             </a:r>
             <a:r>
               <a:rPr lang="en-US" altLang="zh-CN" sz="1200" b="0" i="1" kern="1200" dirty="0" err="1" smtClean="0">
@@ -4428,7 +4404,7 @@
     </p:spTree>
     <p:extLst>
       <p:ext uri="{BB962C8B-B14F-4D97-AF65-F5344CB8AC3E}">
-        <p14:creationId xmlns:p14="http://schemas.microsoft.com/office/powerpoint/2010/main" xmlns="" val="1968569971"/>
+        <p14:creationId xmlns:p14="http://schemas.microsoft.com/office/powerpoint/2010/main" val="1968569971"/>
       </p:ext>
     </p:extLst>
   </p:cSld>
@@ -4513,7 +4489,7 @@
     </p:spTree>
     <p:extLst>
       <p:ext uri="{BB962C8B-B14F-4D97-AF65-F5344CB8AC3E}">
-        <p14:creationId xmlns:p14="http://schemas.microsoft.com/office/powerpoint/2010/main" xmlns="" val="3172042755"/>
+        <p14:creationId xmlns:p14="http://schemas.microsoft.com/office/powerpoint/2010/main" val="3172042755"/>
       </p:ext>
     </p:extLst>
   </p:cSld>
@@ -4705,7 +4681,7 @@
             <a:fld id="{BE19945C-6D4D-B840-ACD0-A260C778347B}" type="datetimeFigureOut">
               <a:rPr lang="en-US" smtClean="0"/>
               <a:pPr/>
-              <a:t>4/27/2014</a:t>
+              <a:t>7/23/2014</a:t>
             </a:fld>
             <a:endParaRPr lang="en-US"/>
           </a:p>
@@ -4757,7 +4733,7 @@
     </p:spTree>
     <p:extLst>
       <p:ext uri="{BB962C8B-B14F-4D97-AF65-F5344CB8AC3E}">
-        <p14:creationId xmlns:p14="http://schemas.microsoft.com/office/powerpoint/2010/main" xmlns="" val="3770021808"/>
+        <p14:creationId xmlns:p14="http://schemas.microsoft.com/office/powerpoint/2010/main" val="3770021808"/>
       </p:ext>
     </p:extLst>
   </p:cSld>
@@ -4960,7 +4936,7 @@
             <a:fld id="{BE19945C-6D4D-B840-ACD0-A260C778347B}" type="datetimeFigureOut">
               <a:rPr lang="en-US" smtClean="0"/>
               <a:pPr/>
-              <a:t>4/27/2014</a:t>
+              <a:t>7/23/2014</a:t>
             </a:fld>
             <a:endParaRPr lang="en-US"/>
           </a:p>
@@ -5012,7 +4988,7 @@
     </p:spTree>
     <p:extLst>
       <p:ext uri="{BB962C8B-B14F-4D97-AF65-F5344CB8AC3E}">
-        <p14:creationId xmlns:p14="http://schemas.microsoft.com/office/powerpoint/2010/main" xmlns="" val="1480095412"/>
+        <p14:creationId xmlns:p14="http://schemas.microsoft.com/office/powerpoint/2010/main" val="1480095412"/>
       </p:ext>
     </p:extLst>
   </p:cSld>
@@ -5132,7 +5108,7 @@
             <a:fld id="{BE19945C-6D4D-B840-ACD0-A260C778347B}" type="datetimeFigureOut">
               <a:rPr lang="en-US" smtClean="0"/>
               <a:pPr/>
-              <a:t>4/27/2014</a:t>
+              <a:t>7/23/2014</a:t>
             </a:fld>
             <a:endParaRPr lang="en-US"/>
           </a:p>
@@ -5184,7 +5160,7 @@
     </p:spTree>
     <p:extLst>
       <p:ext uri="{BB962C8B-B14F-4D97-AF65-F5344CB8AC3E}">
-        <p14:creationId xmlns:p14="http://schemas.microsoft.com/office/powerpoint/2010/main" xmlns="" val="2321233449"/>
+        <p14:creationId xmlns:p14="http://schemas.microsoft.com/office/powerpoint/2010/main" val="2321233449"/>
       </p:ext>
     </p:extLst>
   </p:cSld>
@@ -5314,7 +5290,7 @@
             <a:fld id="{BE19945C-6D4D-B840-ACD0-A260C778347B}" type="datetimeFigureOut">
               <a:rPr lang="en-US" smtClean="0"/>
               <a:pPr/>
-              <a:t>4/27/2014</a:t>
+              <a:t>7/23/2014</a:t>
             </a:fld>
             <a:endParaRPr lang="en-US"/>
           </a:p>
@@ -5366,7 +5342,7 @@
     </p:spTree>
     <p:extLst>
       <p:ext uri="{BB962C8B-B14F-4D97-AF65-F5344CB8AC3E}">
-        <p14:creationId xmlns:p14="http://schemas.microsoft.com/office/powerpoint/2010/main" xmlns="" val="2148529863"/>
+        <p14:creationId xmlns:p14="http://schemas.microsoft.com/office/powerpoint/2010/main" val="2148529863"/>
       </p:ext>
     </p:extLst>
   </p:cSld>
@@ -5631,7 +5607,7 @@
                 </a:solidFill>
               </a:rPr>
               <a:pPr/>
-              <a:t>4/27/2014</a:t>
+              <a:t>7/23/2014</a:t>
             </a:fld>
             <a:endParaRPr lang="en-US">
               <a:solidFill>
@@ -5723,7 +5699,7 @@
     </p:spTree>
     <p:extLst>
       <p:ext uri="{BB962C8B-B14F-4D97-AF65-F5344CB8AC3E}">
-        <p14:creationId xmlns:p14="http://schemas.microsoft.com/office/powerpoint/2010/main" xmlns="" val="2414240118"/>
+        <p14:creationId xmlns:p14="http://schemas.microsoft.com/office/powerpoint/2010/main" val="2414240118"/>
       </p:ext>
     </p:extLst>
   </p:cSld>
@@ -5870,7 +5846,7 @@
                 </a:solidFill>
               </a:rPr>
               <a:pPr/>
-              <a:t>4/27/2014</a:t>
+              <a:t>7/23/2014</a:t>
             </a:fld>
             <a:endParaRPr lang="en-US">
               <a:solidFill>
@@ -6139,7 +6115,7 @@
     </p:spTree>
     <p:extLst>
       <p:ext uri="{BB962C8B-B14F-4D97-AF65-F5344CB8AC3E}">
-        <p14:creationId xmlns:p14="http://schemas.microsoft.com/office/powerpoint/2010/main" xmlns="" val="447654479"/>
+        <p14:creationId xmlns:p14="http://schemas.microsoft.com/office/powerpoint/2010/main" val="447654479"/>
       </p:ext>
     </p:extLst>
   </p:cSld>
@@ -6243,7 +6219,7 @@
                 </a:solidFill>
               </a:rPr>
               <a:pPr/>
-              <a:t>4/27/2014</a:t>
+              <a:t>7/23/2014</a:t>
             </a:fld>
             <a:endParaRPr lang="en-US">
               <a:solidFill>
@@ -6489,7 +6465,7 @@
     </p:spTree>
     <p:extLst>
       <p:ext uri="{BB962C8B-B14F-4D97-AF65-F5344CB8AC3E}">
-        <p14:creationId xmlns:p14="http://schemas.microsoft.com/office/powerpoint/2010/main" xmlns="" val="3251343085"/>
+        <p14:creationId xmlns:p14="http://schemas.microsoft.com/office/powerpoint/2010/main" val="3251343085"/>
       </p:ext>
     </p:extLst>
   </p:cSld>
@@ -6777,7 +6753,7 @@
                 </a:solidFill>
               </a:rPr>
               <a:pPr/>
-              <a:t>4/27/2014</a:t>
+              <a:t>7/23/2014</a:t>
             </a:fld>
             <a:endParaRPr lang="en-US">
               <a:solidFill>
@@ -6995,7 +6971,7 @@
     </p:spTree>
     <p:extLst>
       <p:ext uri="{BB962C8B-B14F-4D97-AF65-F5344CB8AC3E}">
-        <p14:creationId xmlns:p14="http://schemas.microsoft.com/office/powerpoint/2010/main" xmlns="" val="2612420603"/>
+        <p14:creationId xmlns:p14="http://schemas.microsoft.com/office/powerpoint/2010/main" val="2612420603"/>
       </p:ext>
     </p:extLst>
   </p:cSld>
@@ -7421,7 +7397,7 @@
                 </a:solidFill>
               </a:rPr>
               <a:pPr/>
-              <a:t>4/27/2014</a:t>
+              <a:t>7/23/2014</a:t>
             </a:fld>
             <a:endParaRPr lang="en-US">
               <a:solidFill>
@@ -7639,7 +7615,7 @@
     </p:spTree>
     <p:extLst>
       <p:ext uri="{BB962C8B-B14F-4D97-AF65-F5344CB8AC3E}">
-        <p14:creationId xmlns:p14="http://schemas.microsoft.com/office/powerpoint/2010/main" xmlns="" val="2537931968"/>
+        <p14:creationId xmlns:p14="http://schemas.microsoft.com/office/powerpoint/2010/main" val="2537931968"/>
       </p:ext>
     </p:extLst>
   </p:cSld>
@@ -7720,7 +7696,7 @@
                 </a:solidFill>
               </a:rPr>
               <a:pPr/>
-              <a:t>4/27/2014</a:t>
+              <a:t>7/23/2014</a:t>
             </a:fld>
             <a:endParaRPr lang="en-US">
               <a:solidFill>
@@ -7796,7 +7772,7 @@
     </p:spTree>
     <p:extLst>
       <p:ext uri="{BB962C8B-B14F-4D97-AF65-F5344CB8AC3E}">
-        <p14:creationId xmlns:p14="http://schemas.microsoft.com/office/powerpoint/2010/main" xmlns="" val="1062523521"/>
+        <p14:creationId xmlns:p14="http://schemas.microsoft.com/office/powerpoint/2010/main" val="1062523521"/>
       </p:ext>
     </p:extLst>
   </p:cSld>
@@ -7854,7 +7830,7 @@
                 </a:solidFill>
               </a:rPr>
               <a:pPr/>
-              <a:t>4/27/2014</a:t>
+              <a:t>7/23/2014</a:t>
             </a:fld>
             <a:endParaRPr lang="en-US">
               <a:solidFill>
@@ -7930,7 +7906,7 @@
     </p:spTree>
     <p:extLst>
       <p:ext uri="{BB962C8B-B14F-4D97-AF65-F5344CB8AC3E}">
-        <p14:creationId xmlns:p14="http://schemas.microsoft.com/office/powerpoint/2010/main" xmlns="" val="1946478131"/>
+        <p14:creationId xmlns:p14="http://schemas.microsoft.com/office/powerpoint/2010/main" val="1946478131"/>
       </p:ext>
     </p:extLst>
   </p:cSld>
@@ -8023,7 +7999,7 @@
             <a:fld id="{BE19945C-6D4D-B840-ACD0-A260C778347B}" type="datetimeFigureOut">
               <a:rPr lang="en-US" smtClean="0"/>
               <a:pPr/>
-              <a:t>4/27/2014</a:t>
+              <a:t>7/23/2014</a:t>
             </a:fld>
             <a:endParaRPr lang="en-US"/>
           </a:p>
@@ -8224,7 +8200,7 @@
     </p:spTree>
     <p:extLst>
       <p:ext uri="{BB962C8B-B14F-4D97-AF65-F5344CB8AC3E}">
-        <p14:creationId xmlns:p14="http://schemas.microsoft.com/office/powerpoint/2010/main" xmlns="" val="1744924307"/>
+        <p14:creationId xmlns:p14="http://schemas.microsoft.com/office/powerpoint/2010/main" val="1744924307"/>
       </p:ext>
     </p:extLst>
   </p:cSld>
@@ -8457,7 +8433,7 @@
                 </a:solidFill>
               </a:rPr>
               <a:pPr/>
-              <a:t>4/27/2014</a:t>
+              <a:t>7/23/2014</a:t>
             </a:fld>
             <a:endParaRPr lang="en-US">
               <a:solidFill>
@@ -8533,7 +8509,7 @@
     </p:spTree>
     <p:extLst>
       <p:ext uri="{BB962C8B-B14F-4D97-AF65-F5344CB8AC3E}">
-        <p14:creationId xmlns:p14="http://schemas.microsoft.com/office/powerpoint/2010/main" xmlns="" val="2639334174"/>
+        <p14:creationId xmlns:p14="http://schemas.microsoft.com/office/powerpoint/2010/main" val="2639334174"/>
       </p:ext>
     </p:extLst>
   </p:cSld>
@@ -8753,7 +8729,7 @@
                 </a:solidFill>
               </a:rPr>
               <a:pPr/>
-              <a:t>4/27/2014</a:t>
+              <a:t>7/23/2014</a:t>
             </a:fld>
             <a:endParaRPr lang="en-US">
               <a:solidFill>
@@ -8829,7 +8805,7 @@
     </p:spTree>
     <p:extLst>
       <p:ext uri="{BB962C8B-B14F-4D97-AF65-F5344CB8AC3E}">
-        <p14:creationId xmlns:p14="http://schemas.microsoft.com/office/powerpoint/2010/main" xmlns="" val="169768423"/>
+        <p14:creationId xmlns:p14="http://schemas.microsoft.com/office/powerpoint/2010/main" val="169768423"/>
       </p:ext>
     </p:extLst>
   </p:cSld>
@@ -8962,7 +8938,7 @@
                 </a:solidFill>
               </a:rPr>
               <a:pPr/>
-              <a:t>4/27/2014</a:t>
+              <a:t>7/23/2014</a:t>
             </a:fld>
             <a:endParaRPr lang="en-US">
               <a:solidFill>
@@ -9038,7 +9014,7 @@
     </p:spTree>
     <p:extLst>
       <p:ext uri="{BB962C8B-B14F-4D97-AF65-F5344CB8AC3E}">
-        <p14:creationId xmlns:p14="http://schemas.microsoft.com/office/powerpoint/2010/main" xmlns="" val="3836881714"/>
+        <p14:creationId xmlns:p14="http://schemas.microsoft.com/office/powerpoint/2010/main" val="3836881714"/>
       </p:ext>
     </p:extLst>
   </p:cSld>
@@ -9181,7 +9157,7 @@
                 </a:solidFill>
               </a:rPr>
               <a:pPr/>
-              <a:t>4/27/2014</a:t>
+              <a:t>7/23/2014</a:t>
             </a:fld>
             <a:endParaRPr lang="en-US">
               <a:solidFill>
@@ -9257,7 +9233,7 @@
     </p:spTree>
     <p:extLst>
       <p:ext uri="{BB962C8B-B14F-4D97-AF65-F5344CB8AC3E}">
-        <p14:creationId xmlns:p14="http://schemas.microsoft.com/office/powerpoint/2010/main" xmlns="" val="289295885"/>
+        <p14:creationId xmlns:p14="http://schemas.microsoft.com/office/powerpoint/2010/main" val="289295885"/>
       </p:ext>
     </p:extLst>
   </p:cSld>
@@ -9364,7 +9340,7 @@
                 </a:solidFill>
               </a:rPr>
               <a:pPr/>
-              <a:t>4/27/2014</a:t>
+              <a:t>7/23/2014</a:t>
             </a:fld>
             <a:endParaRPr lang="en-US">
               <a:solidFill>
@@ -9565,7 +9541,7 @@
     </p:spTree>
     <p:extLst>
       <p:ext uri="{BB962C8B-B14F-4D97-AF65-F5344CB8AC3E}">
-        <p14:creationId xmlns:p14="http://schemas.microsoft.com/office/powerpoint/2010/main" xmlns="" val="443107464"/>
+        <p14:creationId xmlns:p14="http://schemas.microsoft.com/office/powerpoint/2010/main" val="443107464"/>
       </p:ext>
     </p:extLst>
   </p:cSld>
@@ -9853,7 +9829,7 @@
                 </a:solidFill>
               </a:rPr>
               <a:pPr/>
-              <a:t>4/27/2014</a:t>
+              <a:t>7/23/2014</a:t>
             </a:fld>
             <a:endParaRPr lang="en-US">
               <a:solidFill>
@@ -10019,7 +9995,7 @@
     </p:spTree>
     <p:extLst>
       <p:ext uri="{BB962C8B-B14F-4D97-AF65-F5344CB8AC3E}">
-        <p14:creationId xmlns:p14="http://schemas.microsoft.com/office/powerpoint/2010/main" xmlns="" val="1693121006"/>
+        <p14:creationId xmlns:p14="http://schemas.microsoft.com/office/powerpoint/2010/main" val="1693121006"/>
       </p:ext>
     </p:extLst>
   </p:cSld>
@@ -10445,7 +10421,7 @@
                 </a:solidFill>
               </a:rPr>
               <a:pPr/>
-              <a:t>4/27/2014</a:t>
+              <a:t>7/23/2014</a:t>
             </a:fld>
             <a:endParaRPr lang="en-US">
               <a:solidFill>
@@ -10611,7 +10587,7 @@
     </p:spTree>
     <p:extLst>
       <p:ext uri="{BB962C8B-B14F-4D97-AF65-F5344CB8AC3E}">
-        <p14:creationId xmlns:p14="http://schemas.microsoft.com/office/powerpoint/2010/main" xmlns="" val="507836965"/>
+        <p14:creationId xmlns:p14="http://schemas.microsoft.com/office/powerpoint/2010/main" val="507836965"/>
       </p:ext>
     </p:extLst>
   </p:cSld>
@@ -10706,7 +10682,7 @@
                 </a:solidFill>
               </a:rPr>
               <a:pPr/>
-              <a:t>2014/4/27</a:t>
+              <a:t>2014/7/23</a:t>
             </a:fld>
             <a:endParaRPr lang="zh-CN" altLang="en-US" sz="1800">
               <a:solidFill>
@@ -10796,7 +10772,7 @@
     </p:spTree>
     <p:extLst>
       <p:ext uri="{BB962C8B-B14F-4D97-AF65-F5344CB8AC3E}">
-        <p14:creationId xmlns:p14="http://schemas.microsoft.com/office/powerpoint/2010/main" xmlns="" val="755129618"/>
+        <p14:creationId xmlns:p14="http://schemas.microsoft.com/office/powerpoint/2010/main" val="755129618"/>
       </p:ext>
     </p:extLst>
   </p:cSld>
@@ -10927,7 +10903,7 @@
             <a:fld id="{BE19945C-6D4D-B840-ACD0-A260C778347B}" type="datetimeFigureOut">
               <a:rPr lang="en-US" smtClean="0"/>
               <a:pPr/>
-              <a:t>4/27/2014</a:t>
+              <a:t>7/23/2014</a:t>
             </a:fld>
             <a:endParaRPr lang="en-US"/>
           </a:p>
@@ -11168,7 +11144,7 @@
     </p:spTree>
     <p:extLst>
       <p:ext uri="{BB962C8B-B14F-4D97-AF65-F5344CB8AC3E}">
-        <p14:creationId xmlns:p14="http://schemas.microsoft.com/office/powerpoint/2010/main" xmlns="" val="3416068372"/>
+        <p14:creationId xmlns:p14="http://schemas.microsoft.com/office/powerpoint/2010/main" val="3416068372"/>
       </p:ext>
     </p:extLst>
   </p:cSld>
@@ -11364,7 +11340,7 @@
             <a:fld id="{BE19945C-6D4D-B840-ACD0-A260C778347B}" type="datetimeFigureOut">
               <a:rPr lang="en-US" smtClean="0"/>
               <a:pPr/>
-              <a:t>4/27/2014</a:t>
+              <a:t>7/23/2014</a:t>
             </a:fld>
             <a:endParaRPr lang="en-US"/>
           </a:p>
@@ -11416,7 +11392,7 @@
     </p:spTree>
     <p:extLst>
       <p:ext uri="{BB962C8B-B14F-4D97-AF65-F5344CB8AC3E}">
-        <p14:creationId xmlns:p14="http://schemas.microsoft.com/office/powerpoint/2010/main" xmlns="" val="3554146990"/>
+        <p14:creationId xmlns:p14="http://schemas.microsoft.com/office/powerpoint/2010/main" val="3554146990"/>
       </p:ext>
     </p:extLst>
   </p:cSld>
@@ -11654,7 +11630,7 @@
             <a:fld id="{BE19945C-6D4D-B840-ACD0-A260C778347B}" type="datetimeFigureOut">
               <a:rPr lang="en-US" smtClean="0"/>
               <a:pPr/>
-              <a:t>4/27/2014</a:t>
+              <a:t>7/23/2014</a:t>
             </a:fld>
             <a:endParaRPr lang="en-US"/>
           </a:p>
@@ -11706,7 +11682,7 @@
     </p:spTree>
     <p:extLst>
       <p:ext uri="{BB962C8B-B14F-4D97-AF65-F5344CB8AC3E}">
-        <p14:creationId xmlns:p14="http://schemas.microsoft.com/office/powerpoint/2010/main" xmlns="" val="2495202934"/>
+        <p14:creationId xmlns:p14="http://schemas.microsoft.com/office/powerpoint/2010/main" val="2495202934"/>
       </p:ext>
     </p:extLst>
   </p:cSld>
@@ -12078,7 +12054,7 @@
             <a:fld id="{BE19945C-6D4D-B840-ACD0-A260C778347B}" type="datetimeFigureOut">
               <a:rPr lang="en-US" smtClean="0"/>
               <a:pPr/>
-              <a:t>4/27/2014</a:t>
+              <a:t>7/23/2014</a:t>
             </a:fld>
             <a:endParaRPr lang="en-US"/>
           </a:p>
@@ -12130,7 +12106,7 @@
     </p:spTree>
     <p:extLst>
       <p:ext uri="{BB962C8B-B14F-4D97-AF65-F5344CB8AC3E}">
-        <p14:creationId xmlns:p14="http://schemas.microsoft.com/office/powerpoint/2010/main" xmlns="" val="3173797204"/>
+        <p14:creationId xmlns:p14="http://schemas.microsoft.com/office/powerpoint/2010/main" val="3173797204"/>
       </p:ext>
     </p:extLst>
   </p:cSld>
@@ -12198,7 +12174,7 @@
             <a:fld id="{BE19945C-6D4D-B840-ACD0-A260C778347B}" type="datetimeFigureOut">
               <a:rPr lang="en-US" smtClean="0"/>
               <a:pPr/>
-              <a:t>4/27/2014</a:t>
+              <a:t>7/23/2014</a:t>
             </a:fld>
             <a:endParaRPr lang="en-US"/>
           </a:p>
@@ -12250,7 +12226,7 @@
     </p:spTree>
     <p:extLst>
       <p:ext uri="{BB962C8B-B14F-4D97-AF65-F5344CB8AC3E}">
-        <p14:creationId xmlns:p14="http://schemas.microsoft.com/office/powerpoint/2010/main" xmlns="" val="1870128854"/>
+        <p14:creationId xmlns:p14="http://schemas.microsoft.com/office/powerpoint/2010/main" val="1870128854"/>
       </p:ext>
     </p:extLst>
   </p:cSld>
@@ -12295,7 +12271,7 @@
             <a:fld id="{BE19945C-6D4D-B840-ACD0-A260C778347B}" type="datetimeFigureOut">
               <a:rPr lang="en-US" smtClean="0"/>
               <a:pPr/>
-              <a:t>4/27/2014</a:t>
+              <a:t>7/23/2014</a:t>
             </a:fld>
             <a:endParaRPr lang="en-US"/>
           </a:p>
@@ -12347,7 +12323,7 @@
     </p:spTree>
     <p:extLst>
       <p:ext uri="{BB962C8B-B14F-4D97-AF65-F5344CB8AC3E}">
-        <p14:creationId xmlns:p14="http://schemas.microsoft.com/office/powerpoint/2010/main" xmlns="" val="902588582"/>
+        <p14:creationId xmlns:p14="http://schemas.microsoft.com/office/powerpoint/2010/main" val="902588582"/>
       </p:ext>
     </p:extLst>
   </p:cSld>
@@ -12574,7 +12550,7 @@
             <a:fld id="{BE19945C-6D4D-B840-ACD0-A260C778347B}" type="datetimeFigureOut">
               <a:rPr lang="en-US" smtClean="0"/>
               <a:pPr/>
-              <a:t>4/27/2014</a:t>
+              <a:t>7/23/2014</a:t>
             </a:fld>
             <a:endParaRPr lang="en-US"/>
           </a:p>
@@ -12626,7 +12602,7 @@
     </p:spTree>
     <p:extLst>
       <p:ext uri="{BB962C8B-B14F-4D97-AF65-F5344CB8AC3E}">
-        <p14:creationId xmlns:p14="http://schemas.microsoft.com/office/powerpoint/2010/main" xmlns="" val="2992112800"/>
+        <p14:creationId xmlns:p14="http://schemas.microsoft.com/office/powerpoint/2010/main" val="2992112800"/>
       </p:ext>
     </p:extLst>
   </p:cSld>
@@ -12789,7 +12765,7 @@
             <a:fld id="{BE19945C-6D4D-B840-ACD0-A260C778347B}" type="datetimeFigureOut">
               <a:rPr lang="en-US" smtClean="0"/>
               <a:pPr/>
-              <a:t>4/27/2014</a:t>
+              <a:t>7/23/2014</a:t>
             </a:fld>
             <a:endParaRPr lang="en-US"/>
           </a:p>
@@ -12877,7 +12853,7 @@
     </p:spTree>
     <p:extLst>
       <p:ext uri="{BB962C8B-B14F-4D97-AF65-F5344CB8AC3E}">
-        <p14:creationId xmlns:p14="http://schemas.microsoft.com/office/powerpoint/2010/main" xmlns="" val="3444136005"/>
+        <p14:creationId xmlns:p14="http://schemas.microsoft.com/office/powerpoint/2010/main" val="3444136005"/>
       </p:ext>
     </p:extLst>
   </p:cSld>
@@ -13311,7 +13287,7 @@
                 </a:solidFill>
               </a:rPr>
               <a:pPr/>
-              <a:t>4/27/2014</a:t>
+              <a:t>7/23/2014</a:t>
             </a:fld>
             <a:endParaRPr lang="en-US">
               <a:solidFill>
@@ -13429,7 +13405,7 @@
     </p:spTree>
     <p:extLst>
       <p:ext uri="{BB962C8B-B14F-4D97-AF65-F5344CB8AC3E}">
-        <p14:creationId xmlns:p14="http://schemas.microsoft.com/office/powerpoint/2010/main" xmlns="" val="1092289293"/>
+        <p14:creationId xmlns:p14="http://schemas.microsoft.com/office/powerpoint/2010/main" val="1092289293"/>
       </p:ext>
     </p:extLst>
   </p:cSld>
@@ -13787,7 +13763,7 @@
     </p:spTree>
     <p:extLst>
       <p:ext uri="{BB962C8B-B14F-4D97-AF65-F5344CB8AC3E}">
-        <p14:creationId xmlns:p14="http://schemas.microsoft.com/office/powerpoint/2010/main" xmlns="" val="2934669739"/>
+        <p14:creationId xmlns:p14="http://schemas.microsoft.com/office/powerpoint/2010/main" val="2934669739"/>
       </p:ext>
     </p:extLst>
   </p:cSld>
@@ -13933,7 +13909,7 @@
     </p:spTree>
     <p:extLst>
       <p:ext uri="{BB962C8B-B14F-4D97-AF65-F5344CB8AC3E}">
-        <p14:creationId xmlns:p14="http://schemas.microsoft.com/office/powerpoint/2010/main" xmlns="" val="1761366425"/>
+        <p14:creationId xmlns:p14="http://schemas.microsoft.com/office/powerpoint/2010/main" val="1761366425"/>
       </p:ext>
     </p:extLst>
   </p:cSld>
@@ -14069,7 +14045,6 @@
               <a:rPr lang="en-US" altLang="zh-CN" dirty="0" smtClean="0"/>
               <a:t>…</a:t>
             </a:r>
-            <a:endParaRPr lang="en-US" altLang="zh-CN" dirty="0" smtClean="0"/>
           </a:p>
           <a:p>
             <a:endParaRPr lang="en-US" altLang="zh-CN" dirty="0" smtClean="0"/>
@@ -14086,7 +14061,7 @@
     </p:spTree>
     <p:extLst>
       <p:ext uri="{BB962C8B-B14F-4D97-AF65-F5344CB8AC3E}">
-        <p14:creationId xmlns:p14="http://schemas.microsoft.com/office/powerpoint/2010/main" xmlns="" val="2705560107"/>
+        <p14:creationId xmlns:p14="http://schemas.microsoft.com/office/powerpoint/2010/main" val="2705560107"/>
       </p:ext>
     </p:extLst>
   </p:cSld>
@@ -14172,7 +14147,7 @@
     </p:spTree>
     <p:extLst>
       <p:ext uri="{BB962C8B-B14F-4D97-AF65-F5344CB8AC3E}">
-        <p14:creationId xmlns:p14="http://schemas.microsoft.com/office/powerpoint/2010/main" xmlns="" val="1474024426"/>
+        <p14:creationId xmlns:p14="http://schemas.microsoft.com/office/powerpoint/2010/main" val="1474024426"/>
       </p:ext>
     </p:extLst>
   </p:cSld>
@@ -14247,8 +14222,38 @@
             </a:r>
             <a:r>
               <a:rPr lang="en-US" altLang="zh-CN" dirty="0" smtClean="0"/>
-              <a:t> App new incoming message</a:t>
-            </a:r>
+              <a:t> App new incoming </a:t>
+            </a:r>
+            <a:r>
+              <a:rPr lang="en-US" altLang="zh-CN" dirty="0" smtClean="0"/>
+              <a:t>message</a:t>
+            </a:r>
+          </a:p>
+          <a:p>
+            <a:endParaRPr lang="en-US" altLang="zh-CN" dirty="0"/>
+          </a:p>
+          <a:p>
+            <a:r>
+              <a:rPr lang="en-US" altLang="zh-CN">
+                <a:hlinkClick r:id="rId2"/>
+              </a:rPr>
+              <a:t>https</a:t>
+            </a:r>
+            <a:r>
+              <a:rPr lang="en-US" altLang="zh-CN">
+                <a:hlinkClick r:id="rId2"/>
+              </a:rPr>
+              <a:t>://</a:t>
+            </a:r>
+            <a:r>
+              <a:rPr lang="en-US" altLang="zh-CN" smtClean="0">
+                <a:hlinkClick r:id="rId2"/>
+              </a:rPr>
+              <a:t>github.com/shaobin0604/techshare/tree/master/TestAccessibilityService</a:t>
+            </a:r>
+            <a:endParaRPr lang="en-US" altLang="zh-CN" smtClean="0"/>
+          </a:p>
+          <a:p>
             <a:endParaRPr lang="zh-CN" altLang="en-US" dirty="0"/>
           </a:p>
         </p:txBody>
@@ -14448,7 +14453,7 @@
     </p:spTree>
     <p:extLst>
       <p:ext uri="{BB962C8B-B14F-4D97-AF65-F5344CB8AC3E}">
-        <p14:creationId xmlns:p14="http://schemas.microsoft.com/office/powerpoint/2010/main" xmlns="" val="1857371833"/>
+        <p14:creationId xmlns:p14="http://schemas.microsoft.com/office/powerpoint/2010/main" val="1857371833"/>
       </p:ext>
     </p:extLst>
   </p:cSld>
@@ -14561,11 +14566,7 @@
             </a:pPr>
             <a:r>
               <a:rPr lang="en-US" altLang="zh-CN" dirty="0" smtClean="0"/>
-              <a:t>Build accessibility </a:t>
-            </a:r>
-            <a:r>
-              <a:rPr lang="en-US" altLang="zh-CN" dirty="0" smtClean="0"/>
-              <a:t>service</a:t>
+              <a:t>Build accessibility service</a:t>
             </a:r>
           </a:p>
           <a:p>
@@ -14577,7 +14578,6 @@
               <a:rPr lang="en-US" altLang="zh-CN" dirty="0" smtClean="0"/>
               <a:t>Demo</a:t>
             </a:r>
-            <a:endParaRPr lang="en-US" altLang="zh-CN" dirty="0" smtClean="0"/>
           </a:p>
           <a:p>
             <a:endParaRPr lang="zh-CN" altLang="en-US" dirty="0"/>
@@ -14587,7 +14587,7 @@
     </p:spTree>
     <p:extLst>
       <p:ext uri="{BB962C8B-B14F-4D97-AF65-F5344CB8AC3E}">
-        <p14:creationId xmlns:p14="http://schemas.microsoft.com/office/powerpoint/2010/main" xmlns="" val="4272180582"/>
+        <p14:creationId xmlns:p14="http://schemas.microsoft.com/office/powerpoint/2010/main" val="4272180582"/>
       </p:ext>
     </p:extLst>
   </p:cSld>
@@ -14708,7 +14708,7 @@
     </p:spTree>
     <p:extLst>
       <p:ext uri="{BB962C8B-B14F-4D97-AF65-F5344CB8AC3E}">
-        <p14:creationId xmlns:p14="http://schemas.microsoft.com/office/powerpoint/2010/main" xmlns="" val="3842298644"/>
+        <p14:creationId xmlns:p14="http://schemas.microsoft.com/office/powerpoint/2010/main" val="3842298644"/>
       </p:ext>
     </p:extLst>
   </p:cSld>
@@ -14866,7 +14866,7 @@
           <a:blip r:embed="rId3">
             <a:extLst>
               <a:ext uri="{28A0092B-C50C-407E-A947-70E740481C1C}">
-                <a14:useLocalDpi xmlns:a14="http://schemas.microsoft.com/office/drawing/2010/main" xmlns="" val="0"/>
+                <a14:useLocalDpi xmlns:a14="http://schemas.microsoft.com/office/drawing/2010/main" val="0"/>
               </a:ext>
             </a:extLst>
           </a:blip>
@@ -14889,14 +14889,14 @@
           </a:ln>
           <a:extLst>
             <a:ext uri="{909E8E84-426E-40DD-AFC4-6F175D3DCCD1}">
-              <a14:hiddenFill xmlns:a14="http://schemas.microsoft.com/office/drawing/2010/main" xmlns="">
+              <a14:hiddenFill xmlns:a14="http://schemas.microsoft.com/office/drawing/2010/main">
                 <a:solidFill>
                   <a:schemeClr val="accent1"/>
                 </a:solidFill>
               </a14:hiddenFill>
             </a:ext>
             <a:ext uri="{91240B29-F687-4F45-9708-019B960494DF}">
-              <a14:hiddenLine xmlns:a14="http://schemas.microsoft.com/office/drawing/2010/main" xmlns="" w="9525">
+              <a14:hiddenLine xmlns:a14="http://schemas.microsoft.com/office/drawing/2010/main" w="9525">
                 <a:solidFill>
                   <a:schemeClr val="tx1"/>
                 </a:solidFill>
@@ -14911,7 +14911,7 @@
     </p:spTree>
     <p:extLst>
       <p:ext uri="{BB962C8B-B14F-4D97-AF65-F5344CB8AC3E}">
-        <p14:creationId xmlns:p14="http://schemas.microsoft.com/office/powerpoint/2010/main" xmlns="" val="3778542165"/>
+        <p14:creationId xmlns:p14="http://schemas.microsoft.com/office/powerpoint/2010/main" val="3778542165"/>
       </p:ext>
     </p:extLst>
   </p:cSld>
@@ -15038,7 +15038,7 @@
     </p:spTree>
     <p:extLst>
       <p:ext uri="{BB962C8B-B14F-4D97-AF65-F5344CB8AC3E}">
-        <p14:creationId xmlns:p14="http://schemas.microsoft.com/office/powerpoint/2010/main" xmlns="" val="3293029165"/>
+        <p14:creationId xmlns:p14="http://schemas.microsoft.com/office/powerpoint/2010/main" val="3293029165"/>
       </p:ext>
     </p:extLst>
   </p:cSld>
@@ -15131,7 +15131,7 @@
     </p:spTree>
     <p:extLst>
       <p:ext uri="{BB962C8B-B14F-4D97-AF65-F5344CB8AC3E}">
-        <p14:creationId xmlns:p14="http://schemas.microsoft.com/office/powerpoint/2010/main" xmlns="" val="696886949"/>
+        <p14:creationId xmlns:p14="http://schemas.microsoft.com/office/powerpoint/2010/main" val="696886949"/>
       </p:ext>
     </p:extLst>
   </p:cSld>
@@ -15177,11 +15177,7 @@
           <a:p>
             <a:r>
               <a:rPr lang="en-US" altLang="zh-CN" dirty="0" smtClean="0"/>
-              <a:t>Accessibility service </a:t>
-            </a:r>
-            <a:r>
-              <a:rPr lang="en-US" altLang="zh-CN" dirty="0" smtClean="0"/>
-              <a:t>declaration</a:t>
+              <a:t>Accessibility service declaration</a:t>
             </a:r>
             <a:endParaRPr lang="zh-CN" altLang="en-US" dirty="0"/>
           </a:p>
@@ -15408,7 +15404,7 @@
     </p:spTree>
     <p:extLst>
       <p:ext uri="{BB962C8B-B14F-4D97-AF65-F5344CB8AC3E}">
-        <p14:creationId xmlns:p14="http://schemas.microsoft.com/office/powerpoint/2010/main" xmlns="" val="3636817171"/>
+        <p14:creationId xmlns:p14="http://schemas.microsoft.com/office/powerpoint/2010/main" val="3636817171"/>
       </p:ext>
     </p:extLst>
   </p:cSld>
@@ -15454,11 +15450,7 @@
           <a:p>
             <a:r>
               <a:rPr lang="en-US" altLang="zh-CN" dirty="0" smtClean="0"/>
-              <a:t>Accessibility service </a:t>
-            </a:r>
-            <a:r>
-              <a:rPr lang="en-US" altLang="zh-CN" dirty="0" smtClean="0"/>
-              <a:t>configuration</a:t>
+              <a:t>Accessibility service configuration</a:t>
             </a:r>
             <a:endParaRPr lang="zh-CN" altLang="en-US" dirty="0"/>
           </a:p>
@@ -15963,7 +15955,7 @@
     </p:spTree>
     <p:extLst>
       <p:ext uri="{BB962C8B-B14F-4D97-AF65-F5344CB8AC3E}">
-        <p14:creationId xmlns:p14="http://schemas.microsoft.com/office/powerpoint/2010/main" xmlns="" val="2756219197"/>
+        <p14:creationId xmlns:p14="http://schemas.microsoft.com/office/powerpoint/2010/main" val="2756219197"/>
       </p:ext>
     </p:extLst>
   </p:cSld>
@@ -16038,11 +16030,7 @@
             </a:pPr>
             <a:r>
               <a:rPr lang="en-US" altLang="zh-CN" dirty="0" smtClean="0"/>
-              <a:t> Package </a:t>
-            </a:r>
-            <a:r>
-              <a:rPr lang="en-US" altLang="zh-CN" dirty="0" smtClean="0"/>
-              <a:t>Names</a:t>
+              <a:t> Package Names</a:t>
             </a:r>
           </a:p>
           <a:p>
@@ -16140,7 +16128,7 @@
     </p:spTree>
     <p:extLst>
       <p:ext uri="{BB962C8B-B14F-4D97-AF65-F5344CB8AC3E}">
-        <p14:creationId xmlns:p14="http://schemas.microsoft.com/office/powerpoint/2010/main" xmlns="" val="2601258463"/>
+        <p14:creationId xmlns:p14="http://schemas.microsoft.com/office/powerpoint/2010/main" val="2601258463"/>
       </p:ext>
     </p:extLst>
   </p:cSld>
@@ -16158,7 +16146,7 @@
         <a:sysClr val="windowText" lastClr="000000"/>
       </a:dk1>
       <a:lt1>
-        <a:sysClr val="window" lastClr="FFFFFF"/>
+        <a:sysClr val="window" lastClr="CCE8CF"/>
       </a:lt1>
       <a:dk2>
         <a:srgbClr val="1F497D"/>
@@ -16478,7 +16466,7 @@
         <a:sysClr val="windowText" lastClr="000000"/>
       </a:dk1>
       <a:lt1>
-        <a:sysClr val="window" lastClr="FFFFFF"/>
+        <a:sysClr val="window" lastClr="CCE8CF"/>
       </a:lt1>
       <a:dk2>
         <a:srgbClr val="1F497D"/>
@@ -16798,7 +16786,7 @@
         <a:sysClr val="windowText" lastClr="000000"/>
       </a:dk1>
       <a:lt1>
-        <a:sysClr val="window" lastClr="FFFFFF"/>
+        <a:sysClr val="window" lastClr="CCE8CF"/>
       </a:lt1>
       <a:dk2>
         <a:srgbClr val="1F497D"/>
@@ -17111,21 +17099,6 @@
 </file>
 
 <file path=customXml/item1.xml><?xml version="1.0" encoding="utf-8"?>
-<?mso-contentType ?>
-<FormTemplates xmlns="http://schemas.microsoft.com/sharepoint/v3/contenttype/forms">
-  <Display>DocumentLibraryForm</Display>
-  <Edit>DocumentLibraryForm</Edit>
-  <New>DocumentLibraryForm</New>
-</FormTemplates>
-</file>
-
-<file path=customXml/item2.xml><?xml version="1.0" encoding="utf-8"?>
-<p:properties xmlns:p="http://schemas.microsoft.com/office/2006/metadata/properties" xmlns:xsi="http://www.w3.org/2001/XMLSchema-instance">
-  <documentManagement/>
-</p:properties>
-</file>
-
-<file path=customXml/item3.xml><?xml version="1.0" encoding="utf-8"?>
 <ct:contentTypeSchema xmlns:ct="http://schemas.microsoft.com/office/2006/metadata/contentType" xmlns:ma="http://schemas.microsoft.com/office/2006/metadata/properties/metaAttributes" ct:_="" ma:_="" ma:contentTypeName="Document" ma:contentTypeID="0x01010088DCE1DC00522843A821C0778C0DEA3C" ma:contentTypeVersion="0" ma:contentTypeDescription="Create a new document." ma:contentTypeScope="" ma:versionID="e9d9f270663114b42349b350ea9787dd">
   <xsd:schema xmlns:xsd="http://www.w3.org/2001/XMLSchema" xmlns:p="http://schemas.microsoft.com/office/2006/metadata/properties" targetNamespace="http://schemas.microsoft.com/office/2006/metadata/properties" ma:root="true" ma:fieldsID="4aeb20c0e3442673af7ee10786458764">
     <xsd:element name="properties">
@@ -17174,10 +17147,32 @@
 </ct:contentTypeSchema>
 </file>
 
+<file path=customXml/item2.xml><?xml version="1.0" encoding="utf-8"?>
+<p:properties xmlns:p="http://schemas.microsoft.com/office/2006/metadata/properties" xmlns:xsi="http://www.w3.org/2001/XMLSchema-instance">
+  <documentManagement/>
+</p:properties>
+</file>
+
+<file path=customXml/item3.xml><?xml version="1.0" encoding="utf-8"?>
+<?mso-contentType ?>
+<FormTemplates xmlns="http://schemas.microsoft.com/sharepoint/v3/contenttype/forms">
+  <Display>DocumentLibraryForm</Display>
+  <Edit>DocumentLibraryForm</Edit>
+  <New>DocumentLibraryForm</New>
+</FormTemplates>
+</file>
+
 <file path=customXml/itemProps1.xml><?xml version="1.0" encoding="utf-8"?>
-<ds:datastoreItem xmlns:ds="http://schemas.openxmlformats.org/officeDocument/2006/customXml" ds:itemID="{50BABDF4-C590-46C3-B9F2-A3B156EEF1FB}">
+<ds:datastoreItem xmlns:ds="http://schemas.openxmlformats.org/officeDocument/2006/customXml" ds:itemID="{F9C2503C-EA84-40E2-8D0F-62D074699A7D}">
   <ds:schemaRefs>
-    <ds:schemaRef ds:uri="http://schemas.microsoft.com/sharepoint/v3/contenttype/forms"/>
+    <ds:schemaRef ds:uri="http://schemas.microsoft.com/office/2006/metadata/contentType"/>
+    <ds:schemaRef ds:uri="http://schemas.microsoft.com/office/2006/metadata/properties/metaAttributes"/>
+    <ds:schemaRef ds:uri="http://www.w3.org/2001/XMLSchema"/>
+    <ds:schemaRef ds:uri="http://schemas.microsoft.com/office/2006/metadata/properties"/>
+    <ds:schemaRef ds:uri="http://schemas.openxmlformats.org/package/2006/metadata/core-properties"/>
+    <ds:schemaRef ds:uri="http://purl.org/dc/elements/1.1/"/>
+    <ds:schemaRef ds:uri="http://purl.org/dc/terms/"/>
+    <ds:schemaRef ds:uri="http://schemas.microsoft.com/office/internal/2005/internalDocumentation"/>
   </ds:schemaRefs>
 </ds:datastoreItem>
 </file>
@@ -17197,16 +17192,9 @@
 </file>
 
 <file path=customXml/itemProps3.xml><?xml version="1.0" encoding="utf-8"?>
-<ds:datastoreItem xmlns:ds="http://schemas.openxmlformats.org/officeDocument/2006/customXml" ds:itemID="{F9C2503C-EA84-40E2-8D0F-62D074699A7D}">
+<ds:datastoreItem xmlns:ds="http://schemas.openxmlformats.org/officeDocument/2006/customXml" ds:itemID="{50BABDF4-C590-46C3-B9F2-A3B156EEF1FB}">
   <ds:schemaRefs>
-    <ds:schemaRef ds:uri="http://schemas.microsoft.com/office/2006/metadata/contentType"/>
-    <ds:schemaRef ds:uri="http://schemas.microsoft.com/office/2006/metadata/properties/metaAttributes"/>
-    <ds:schemaRef ds:uri="http://www.w3.org/2001/XMLSchema"/>
-    <ds:schemaRef ds:uri="http://schemas.microsoft.com/office/2006/metadata/properties"/>
-    <ds:schemaRef ds:uri="http://schemas.openxmlformats.org/package/2006/metadata/core-properties"/>
-    <ds:schemaRef ds:uri="http://purl.org/dc/elements/1.1/"/>
-    <ds:schemaRef ds:uri="http://purl.org/dc/terms/"/>
-    <ds:schemaRef ds:uri="http://schemas.microsoft.com/office/internal/2005/internalDocumentation"/>
+    <ds:schemaRef ds:uri="http://schemas.microsoft.com/sharepoint/v3/contenttype/forms"/>
   </ds:schemaRefs>
 </ds:datastoreItem>
 </file>
</xml_diff>